<commit_message>
changed a little bit
</commit_message>
<xml_diff>
--- a/Seminar 1.pptx
+++ b/Seminar 1.pptx
@@ -217,7 +217,7 @@
           <a:p>
             <a:fld id="{65700FC0-9E7A-4C53-8A3B-3C3C9A736C42}" type="datetimeFigureOut">
               <a:rPr lang="en-US" smtClean="0"/>
-              <a:t>11-Mar-16</a:t>
+              <a:t>3/11/2016</a:t>
             </a:fld>
             <a:endParaRPr lang="en-US"/>
           </a:p>
@@ -382,7 +382,7 @@
           <a:p>
             <a:fld id="{8AF122B6-E47E-4A80-A9F3-23FD10D674FE}" type="datetimeFigureOut">
               <a:rPr lang="en-US" smtClean="0"/>
-              <a:t>11-Mar-16</a:t>
+              <a:t>3/11/2016</a:t>
             </a:fld>
             <a:endParaRPr lang="en-US"/>
           </a:p>
@@ -693,7 +693,7 @@
             <a:fld id="{349BF3EA-1A78-4F07-BDC0-C8A1BD461199}" type="datetimeFigureOut">
               <a:rPr lang="en-US" smtClean="0"/>
               <a:pPr/>
-              <a:t>11-Mar-16</a:t>
+              <a:t>3/11/2016</a:t>
             </a:fld>
             <a:endParaRPr lang="en-US"/>
           </a:p>
@@ -1054,7 +1054,7 @@
           <a:p>
             <a:fld id="{349BF3EA-1A78-4F07-BDC0-C8A1BD461199}" type="datetimeFigureOut">
               <a:rPr lang="en-US" smtClean="0"/>
-              <a:t>11-Mar-16</a:t>
+              <a:t>3/11/2016</a:t>
             </a:fld>
             <a:endParaRPr lang="en-US"/>
           </a:p>
@@ -1252,7 +1252,7 @@
           <a:p>
             <a:fld id="{349BF3EA-1A78-4F07-BDC0-C8A1BD461199}" type="datetimeFigureOut">
               <a:rPr lang="en-US" smtClean="0"/>
-              <a:t>11-Mar-16</a:t>
+              <a:t>3/11/2016</a:t>
             </a:fld>
             <a:endParaRPr lang="en-US"/>
           </a:p>
@@ -1500,7 +1500,7 @@
           <a:p>
             <a:fld id="{349BF3EA-1A78-4F07-BDC0-C8A1BD461199}" type="datetimeFigureOut">
               <a:rPr lang="en-US" smtClean="0"/>
-              <a:t>11-Mar-16</a:t>
+              <a:t>3/11/2016</a:t>
             </a:fld>
             <a:endParaRPr lang="en-US"/>
           </a:p>
@@ -1771,7 +1771,7 @@
           <a:p>
             <a:fld id="{349BF3EA-1A78-4F07-BDC0-C8A1BD461199}" type="datetimeFigureOut">
               <a:rPr lang="en-US" smtClean="0"/>
-              <a:t>11-Mar-16</a:t>
+              <a:t>3/11/2016</a:t>
             </a:fld>
             <a:endParaRPr lang="en-US"/>
           </a:p>
@@ -2142,7 +2142,7 @@
           <a:p>
             <a:fld id="{349BF3EA-1A78-4F07-BDC0-C8A1BD461199}" type="datetimeFigureOut">
               <a:rPr lang="en-US" smtClean="0"/>
-              <a:t>11-Mar-16</a:t>
+              <a:t>3/11/2016</a:t>
             </a:fld>
             <a:endParaRPr lang="en-US"/>
           </a:p>
@@ -2473,7 +2473,7 @@
           <a:p>
             <a:fld id="{349BF3EA-1A78-4F07-BDC0-C8A1BD461199}" type="datetimeFigureOut">
               <a:rPr lang="en-US" smtClean="0"/>
-              <a:t>11-Mar-16</a:t>
+              <a:t>3/11/2016</a:t>
             </a:fld>
             <a:endParaRPr lang="en-US"/>
           </a:p>
@@ -2728,7 +2728,7 @@
           <a:p>
             <a:fld id="{349BF3EA-1A78-4F07-BDC0-C8A1BD461199}" type="datetimeFigureOut">
               <a:rPr lang="en-US" smtClean="0"/>
-              <a:t>11-Mar-16</a:t>
+              <a:t>3/11/2016</a:t>
             </a:fld>
             <a:endParaRPr lang="en-US"/>
           </a:p>
@@ -2835,7 +2835,7 @@
           <a:p>
             <a:fld id="{349BF3EA-1A78-4F07-BDC0-C8A1BD461199}" type="datetimeFigureOut">
               <a:rPr lang="en-US" smtClean="0"/>
-              <a:t>11-Mar-16</a:t>
+              <a:t>3/11/2016</a:t>
             </a:fld>
             <a:endParaRPr lang="en-US"/>
           </a:p>
@@ -3134,7 +3134,7 @@
           <a:p>
             <a:fld id="{349BF3EA-1A78-4F07-BDC0-C8A1BD461199}" type="datetimeFigureOut">
               <a:rPr lang="en-US" smtClean="0"/>
-              <a:t>11-Mar-16</a:t>
+              <a:t>3/11/2016</a:t>
             </a:fld>
             <a:endParaRPr lang="en-US"/>
           </a:p>
@@ -3422,7 +3422,7 @@
           <a:p>
             <a:fld id="{349BF3EA-1A78-4F07-BDC0-C8A1BD461199}" type="datetimeFigureOut">
               <a:rPr lang="en-US" smtClean="0"/>
-              <a:t>11-Mar-16</a:t>
+              <a:t>3/11/2016</a:t>
             </a:fld>
             <a:endParaRPr lang="en-US"/>
           </a:p>
@@ -3552,7 +3552,7 @@
             <a:fld id="{349BF3EA-1A78-4F07-BDC0-C8A1BD461199}" type="datetimeFigureOut">
               <a:rPr lang="en-US" smtClean="0"/>
               <a:pPr/>
-              <a:t>11-Mar-16</a:t>
+              <a:t>3/11/2016</a:t>
             </a:fld>
             <a:endParaRPr lang="en-US"/>
           </a:p>
@@ -4929,6 +4929,15 @@
         <p:blipFill>
           <a:blip r:embed="rId5" cstate="print">
             <a:extLst>
+              <a:ext uri="{BEBA8EAE-BF5A-486C-A8C5-ECC9F3942E4B}">
+                <a14:imgProps xmlns:a14="http://schemas.microsoft.com/office/drawing/2010/main">
+                  <a14:imgLayer r:embed="rId6">
+                    <a14:imgEffect>
+                      <a14:sharpenSoften amount="50000"/>
+                    </a14:imgEffect>
+                  </a14:imgLayer>
+                </a14:imgProps>
+              </a:ext>
               <a:ext uri="{28A0092B-C50C-407E-A947-70E740481C1C}">
                 <a14:useLocalDpi xmlns:a14="http://schemas.microsoft.com/office/drawing/2010/main" val="0"/>
               </a:ext>
@@ -5067,75 +5076,96 @@
             <a:pPr lvl="1"/>
             <a:r>
               <a:rPr lang="en-US" dirty="0" smtClean="0"/>
-              <a:t>IMU sensor, and flex sensor</a:t>
-            </a:r>
-            <a:r>
-              <a:rPr lang="en-US" dirty="0" smtClean="0"/>
-              <a:t>.</a:t>
+              <a:t>IMU sensor, and flex sensor.</a:t>
             </a:r>
           </a:p>
           <a:p>
             <a:pPr lvl="1"/>
-            <a:r>
-              <a:rPr lang="en-US" dirty="0" smtClean="0"/>
-              <a:t>Electrical Impedance Tomography (EIT)</a:t>
-            </a:r>
-            <a:endParaRPr lang="en-US" dirty="0"/>
-          </a:p>
-          <a:p>
-            <a:pPr marL="400050">
-              <a:buFontTx/>
-              <a:buChar char="-"/>
-            </a:pPr>
-            <a:r>
-              <a:rPr lang="en-US" dirty="0" smtClean="0"/>
-              <a:t>Measuring heartbeat by sweating </a:t>
-            </a:r>
-          </a:p>
-          <a:p>
-            <a:pPr marL="400050">
-              <a:buFontTx/>
-              <a:buChar char="-"/>
-            </a:pPr>
-            <a:r>
-              <a:rPr lang="en-US" dirty="0" smtClean="0"/>
-              <a:t>Detecting Stress and Reducing Stress</a:t>
-            </a:r>
-          </a:p>
-          <a:p>
-            <a:pPr marL="400050">
-              <a:buFontTx/>
-              <a:buChar char="-"/>
-            </a:pPr>
-            <a:r>
-              <a:rPr lang="en-US" dirty="0" smtClean="0"/>
-              <a:t>Using google glasses to make health care </a:t>
-            </a:r>
-            <a:r>
-              <a:rPr lang="en-US" dirty="0" smtClean="0"/>
-              <a:t>system</a:t>
-            </a:r>
-          </a:p>
-          <a:p>
-            <a:pPr marL="400050">
-              <a:buFontTx/>
-              <a:buChar char="-"/>
-            </a:pPr>
-            <a:r>
-              <a:rPr lang="en-US" dirty="0" smtClean="0"/>
-              <a:t>However, the problems:</a:t>
-            </a:r>
-          </a:p>
-          <a:p>
-            <a:pPr marL="800100" lvl="1"/>
             <a:r>
               <a:rPr lang="en-US" dirty="0" smtClean="0">
                 <a:solidFill>
                   <a:srgbClr val="FF0000"/>
                 </a:solidFill>
               </a:rPr>
-              <a:t>Do not have a basic knowledge about bio</a:t>
-            </a:r>
+              <a:t>Electrical Impedance Tomography (EIT)</a:t>
+            </a:r>
+            <a:endParaRPr lang="en-US" dirty="0">
+              <a:solidFill>
+                <a:srgbClr val="FF0000"/>
+              </a:solidFill>
+            </a:endParaRPr>
+          </a:p>
+          <a:p>
+            <a:pPr marL="400050">
+              <a:buFontTx/>
+              <a:buChar char="-"/>
+            </a:pPr>
+            <a:r>
+              <a:rPr lang="en-US" dirty="0" smtClean="0"/>
+              <a:t>Measuring heartbeat </a:t>
+            </a:r>
+            <a:r>
+              <a:rPr lang="en-US" dirty="0" smtClean="0">
+                <a:solidFill>
+                  <a:srgbClr val="FF0000"/>
+                </a:solidFill>
+              </a:rPr>
+              <a:t>by sweating </a:t>
+            </a:r>
+          </a:p>
+          <a:p>
+            <a:pPr marL="400050">
+              <a:buFontTx/>
+              <a:buChar char="-"/>
+            </a:pPr>
+            <a:r>
+              <a:rPr lang="en-US" dirty="0" smtClean="0"/>
+              <a:t>Detecting Stress and Reducing Stress</a:t>
+            </a:r>
+          </a:p>
+          <a:p>
+            <a:pPr marL="400050">
+              <a:buFontTx/>
+              <a:buChar char="-"/>
+            </a:pPr>
+            <a:r>
+              <a:rPr lang="en-US" dirty="0" smtClean="0"/>
+              <a:t>Using google glasses to make health care system</a:t>
+            </a:r>
+          </a:p>
+          <a:p>
+            <a:pPr marL="400050">
+              <a:buFontTx/>
+              <a:buChar char="-"/>
+            </a:pPr>
+            <a:r>
+              <a:rPr lang="en-US" dirty="0" smtClean="0"/>
+              <a:t>However, the problems:</a:t>
+            </a:r>
+          </a:p>
+          <a:p>
+            <a:pPr marL="800100" lvl="1"/>
+            <a:r>
+              <a:rPr lang="en-US" dirty="0" smtClean="0">
+                <a:solidFill>
+                  <a:srgbClr val="FF0000"/>
+                </a:solidFill>
+              </a:rPr>
+              <a:t>Do not have a basic knowledge about </a:t>
+            </a:r>
+            <a:r>
+              <a:rPr lang="en-US" dirty="0" smtClean="0">
+                <a:solidFill>
+                  <a:srgbClr val="FF0000"/>
+                </a:solidFill>
+              </a:rPr>
+              <a:t>biomedical.</a:t>
+            </a:r>
+            <a:endParaRPr lang="en-US" dirty="0" smtClean="0">
+              <a:solidFill>
+                <a:srgbClr val="FF0000"/>
+              </a:solidFill>
+            </a:endParaRPr>
           </a:p>
           <a:p>
             <a:pPr marL="800100" lvl="1"/>

</xml_diff>